<commit_message>
uploaded the latest PPT
</commit_message>
<xml_diff>
--- a/Documentation/cs308_2012_team14_final_pres.pptx
+++ b/Documentation/cs308_2012_team14_final_pres.pptx
@@ -5,7 +5,7 @@
     <p:sldMasterId id="2147483660" r:id="rId1"/>
   </p:sldMasterIdLst>
   <p:notesMasterIdLst>
-    <p:notesMasterId r:id="rId16"/>
+    <p:notesMasterId r:id="rId17"/>
   </p:notesMasterIdLst>
   <p:sldIdLst>
     <p:sldId id="256" r:id="rId2"/>
@@ -15,13 +15,14 @@
     <p:sldId id="260" r:id="rId6"/>
     <p:sldId id="261" r:id="rId7"/>
     <p:sldId id="262" r:id="rId8"/>
-    <p:sldId id="263" r:id="rId9"/>
-    <p:sldId id="264" r:id="rId10"/>
-    <p:sldId id="265" r:id="rId11"/>
-    <p:sldId id="266" r:id="rId12"/>
-    <p:sldId id="267" r:id="rId13"/>
-    <p:sldId id="268" r:id="rId14"/>
-    <p:sldId id="269" r:id="rId15"/>
+    <p:sldId id="270" r:id="rId9"/>
+    <p:sldId id="263" r:id="rId10"/>
+    <p:sldId id="264" r:id="rId11"/>
+    <p:sldId id="265" r:id="rId12"/>
+    <p:sldId id="266" r:id="rId13"/>
+    <p:sldId id="267" r:id="rId14"/>
+    <p:sldId id="268" r:id="rId15"/>
+    <p:sldId id="269" r:id="rId16"/>
   </p:sldIdLst>
   <p:sldSz cx="9144000" cy="6858000" type="screen4x3"/>
   <p:notesSz cx="6858000" cy="9144000"/>
@@ -631,7 +632,7 @@
     </p:spTree>
     <p:extLst>
       <p:ext uri="{BB962C8B-B14F-4D97-AF65-F5344CB8AC3E}">
-        <p14:creationId xmlns:p14="http://schemas.microsoft.com/office/powerpoint/2010/main" val="1154857096"/>
+        <p14:creationId xmlns:p14="http://schemas.microsoft.com/office/powerpoint/2010/main" val="3804972589"/>
       </p:ext>
     </p:extLst>
   </p:cSld>
@@ -715,7 +716,7 @@
     </p:spTree>
     <p:extLst>
       <p:ext uri="{BB962C8B-B14F-4D97-AF65-F5344CB8AC3E}">
-        <p14:creationId xmlns:p14="http://schemas.microsoft.com/office/powerpoint/2010/main" val="2855482947"/>
+        <p14:creationId xmlns:p14="http://schemas.microsoft.com/office/powerpoint/2010/main" val="1154857096"/>
       </p:ext>
     </p:extLst>
   </p:cSld>
@@ -799,7 +800,7 @@
     </p:spTree>
     <p:extLst>
       <p:ext uri="{BB962C8B-B14F-4D97-AF65-F5344CB8AC3E}">
-        <p14:creationId xmlns:p14="http://schemas.microsoft.com/office/powerpoint/2010/main" val="1726585263"/>
+        <p14:creationId xmlns:p14="http://schemas.microsoft.com/office/powerpoint/2010/main" val="2855482947"/>
       </p:ext>
     </p:extLst>
   </p:cSld>
@@ -883,7 +884,7 @@
     </p:spTree>
     <p:extLst>
       <p:ext uri="{BB962C8B-B14F-4D97-AF65-F5344CB8AC3E}">
-        <p14:creationId xmlns:p14="http://schemas.microsoft.com/office/powerpoint/2010/main" val="928026298"/>
+        <p14:creationId xmlns:p14="http://schemas.microsoft.com/office/powerpoint/2010/main" val="1726585263"/>
       </p:ext>
     </p:extLst>
   </p:cSld>
@@ -959,6 +960,90 @@
             <a:fld id="{7755B56D-450F-4392-A26B-213930B4580E}" type="slidenum">
               <a:rPr lang="en-US" smtClean="0"/>
               <a:t>14</a:t>
+            </a:fld>
+            <a:endParaRPr lang="en-US"/>
+          </a:p>
+        </p:txBody>
+      </p:sp>
+    </p:spTree>
+    <p:extLst>
+      <p:ext uri="{BB962C8B-B14F-4D97-AF65-F5344CB8AC3E}">
+        <p14:creationId xmlns:p14="http://schemas.microsoft.com/office/powerpoint/2010/main" val="928026298"/>
+      </p:ext>
+    </p:extLst>
+  </p:cSld>
+  <p:clrMapOvr>
+    <a:masterClrMapping/>
+  </p:clrMapOvr>
+</p:notes>
+</file>
+
+<file path=ppt/notesSlides/notesSlide15.xml><?xml version="1.0" encoding="utf-8"?>
+<p:notes xmlns:a="http://schemas.openxmlformats.org/drawingml/2006/main" xmlns:r="http://schemas.openxmlformats.org/officeDocument/2006/relationships" xmlns:p="http://schemas.openxmlformats.org/presentationml/2006/main">
+  <p:cSld>
+    <p:spTree>
+      <p:nvGrpSpPr>
+        <p:cNvPr id="1" name=""/>
+        <p:cNvGrpSpPr/>
+        <p:nvPr/>
+      </p:nvGrpSpPr>
+      <p:grpSpPr>
+        <a:xfrm>
+          <a:off x="0" y="0"/>
+          <a:ext cx="0" cy="0"/>
+          <a:chOff x="0" y="0"/>
+          <a:chExt cx="0" cy="0"/>
+        </a:xfrm>
+      </p:grpSpPr>
+      <p:sp>
+        <p:nvSpPr>
+          <p:cNvPr id="2" name="Slide Image Placeholder 1"/>
+          <p:cNvSpPr>
+            <a:spLocks noGrp="1" noRot="1" noChangeAspect="1"/>
+          </p:cNvSpPr>
+          <p:nvPr>
+            <p:ph type="sldImg"/>
+          </p:nvPr>
+        </p:nvSpPr>
+        <p:spPr/>
+      </p:sp>
+      <p:sp>
+        <p:nvSpPr>
+          <p:cNvPr id="3" name="Notes Placeholder 2"/>
+          <p:cNvSpPr>
+            <a:spLocks noGrp="1"/>
+          </p:cNvSpPr>
+          <p:nvPr>
+            <p:ph type="body" idx="1"/>
+          </p:nvPr>
+        </p:nvSpPr>
+        <p:spPr/>
+        <p:txBody>
+          <a:bodyPr/>
+          <a:lstStyle/>
+          <a:p>
+            <a:endParaRPr lang="en-US"/>
+          </a:p>
+        </p:txBody>
+      </p:sp>
+      <p:sp>
+        <p:nvSpPr>
+          <p:cNvPr id="4" name="Slide Number Placeholder 3"/>
+          <p:cNvSpPr>
+            <a:spLocks noGrp="1"/>
+          </p:cNvSpPr>
+          <p:nvPr>
+            <p:ph type="sldNum" sz="quarter" idx="10"/>
+          </p:nvPr>
+        </p:nvSpPr>
+        <p:spPr/>
+        <p:txBody>
+          <a:bodyPr/>
+          <a:lstStyle/>
+          <a:p>
+            <a:fld id="{7755B56D-450F-4392-A26B-213930B4580E}" type="slidenum">
+              <a:rPr lang="en-US" smtClean="0"/>
+              <a:t>15</a:t>
             </a:fld>
             <a:endParaRPr lang="en-US"/>
           </a:p>
@@ -1555,7 +1640,7 @@
     </p:spTree>
     <p:extLst>
       <p:ext uri="{BB962C8B-B14F-4D97-AF65-F5344CB8AC3E}">
-        <p14:creationId xmlns:p14="http://schemas.microsoft.com/office/powerpoint/2010/main" val="2022523703"/>
+        <p14:creationId xmlns:p14="http://schemas.microsoft.com/office/powerpoint/2010/main" val="2735789575"/>
       </p:ext>
     </p:extLst>
   </p:cSld>
@@ -1639,7 +1724,7 @@
     </p:spTree>
     <p:extLst>
       <p:ext uri="{BB962C8B-B14F-4D97-AF65-F5344CB8AC3E}">
-        <p14:creationId xmlns:p14="http://schemas.microsoft.com/office/powerpoint/2010/main" val="3804972589"/>
+        <p14:creationId xmlns:p14="http://schemas.microsoft.com/office/powerpoint/2010/main" val="2022523703"/>
       </p:ext>
     </p:extLst>
   </p:cSld>
@@ -5232,6 +5317,937 @@
           <a:p>
             <a:r>
               <a:rPr lang="en-US" dirty="0" smtClean="0"/>
+              <a:t>Hardware</a:t>
+            </a:r>
+          </a:p>
+          <a:p>
+            <a:pPr lvl="1"/>
+            <a:r>
+              <a:rPr lang="en-US" dirty="0" smtClean="0"/>
+              <a:t>Camera mounting</a:t>
+            </a:r>
+            <a:endParaRPr lang="en-US" dirty="0"/>
+          </a:p>
+          <a:p>
+            <a:pPr lvl="2"/>
+            <a:r>
+              <a:rPr lang="en-US" dirty="0" smtClean="0"/>
+              <a:t>Front</a:t>
+            </a:r>
+          </a:p>
+          <a:p>
+            <a:pPr lvl="3"/>
+            <a:r>
+              <a:rPr lang="en-US" sz="1800" dirty="0" smtClean="0"/>
+              <a:t>will </a:t>
+            </a:r>
+            <a:r>
+              <a:rPr lang="en-US" sz="1800" dirty="0"/>
+              <a:t>block the sharp </a:t>
+            </a:r>
+            <a:r>
+              <a:rPr lang="en-US" sz="1800" dirty="0" smtClean="0"/>
+              <a:t>sensors</a:t>
+            </a:r>
+          </a:p>
+          <a:p>
+            <a:pPr lvl="3"/>
+            <a:r>
+              <a:rPr lang="en-US" sz="1800" dirty="0"/>
+              <a:t>w</a:t>
+            </a:r>
+            <a:r>
+              <a:rPr lang="en-US" sz="1800" dirty="0" smtClean="0"/>
+              <a:t>ill block grippers movement</a:t>
+            </a:r>
+            <a:endParaRPr lang="en-US" sz="1800" dirty="0"/>
+          </a:p>
+          <a:p>
+            <a:pPr lvl="2"/>
+            <a:r>
+              <a:rPr lang="en-US" dirty="0"/>
+              <a:t>Top </a:t>
+            </a:r>
+          </a:p>
+          <a:p>
+            <a:pPr lvl="3"/>
+            <a:r>
+              <a:rPr lang="en-US" sz="1800" dirty="0" smtClean="0"/>
+              <a:t>Gripper </a:t>
+            </a:r>
+            <a:r>
+              <a:rPr lang="en-US" sz="1800" dirty="0" err="1"/>
+              <a:t>arp</a:t>
+            </a:r>
+            <a:r>
+              <a:rPr lang="en-US" sz="1800" dirty="0"/>
+              <a:t> in its </a:t>
+            </a:r>
+            <a:r>
+              <a:rPr lang="en-US" sz="1800" dirty="0" smtClean="0"/>
+              <a:t>path</a:t>
+            </a:r>
+            <a:endParaRPr lang="en-US" sz="1800" dirty="0"/>
+          </a:p>
+          <a:p>
+            <a:pPr lvl="1"/>
+            <a:r>
+              <a:rPr lang="en-US" dirty="0" smtClean="0"/>
+              <a:t>Sensor</a:t>
+            </a:r>
+            <a:endParaRPr lang="en-US" dirty="0"/>
+          </a:p>
+          <a:p>
+            <a:pPr lvl="2"/>
+            <a:r>
+              <a:rPr lang="en-US" dirty="0"/>
+              <a:t>Single sensor – missed the ball many </a:t>
+            </a:r>
+            <a:r>
+              <a:rPr lang="en-US" dirty="0" smtClean="0"/>
+              <a:t>times</a:t>
+            </a:r>
+          </a:p>
+          <a:p>
+            <a:pPr lvl="1"/>
+            <a:r>
+              <a:rPr lang="en-US" dirty="0" smtClean="0"/>
+              <a:t>Solution</a:t>
+            </a:r>
+          </a:p>
+          <a:p>
+            <a:pPr lvl="2"/>
+            <a:r>
+              <a:rPr lang="en-US" dirty="0" smtClean="0"/>
+              <a:t>Increase the arm’s length</a:t>
+            </a:r>
+          </a:p>
+          <a:p>
+            <a:pPr lvl="2"/>
+            <a:r>
+              <a:rPr lang="en-US" dirty="0" smtClean="0"/>
+              <a:t>Place 2 sensors ON the Camera</a:t>
+            </a:r>
+          </a:p>
+          <a:p>
+            <a:pPr lvl="2"/>
+            <a:r>
+              <a:rPr lang="en-US" dirty="0" smtClean="0"/>
+              <a:t>Fix the Camera in front of bot</a:t>
+            </a:r>
+          </a:p>
+          <a:p>
+            <a:pPr lvl="2"/>
+            <a:endParaRPr lang="en-US" dirty="0"/>
+          </a:p>
+        </p:txBody>
+      </p:sp>
+      <p:pic>
+        <p:nvPicPr>
+          <p:cNvPr id="5" name="Picture 4"/>
+          <p:cNvPicPr>
+            <a:picLocks noChangeAspect="1"/>
+          </p:cNvPicPr>
+          <p:nvPr/>
+        </p:nvPicPr>
+        <p:blipFill>
+          <a:blip r:embed="rId3" cstate="print">
+            <a:extLst>
+              <a:ext uri="{28A0092B-C50C-407E-A947-70E740481C1C}">
+                <a14:useLocalDpi xmlns:a14="http://schemas.microsoft.com/office/drawing/2010/main" val="0"/>
+              </a:ext>
+            </a:extLst>
+          </a:blip>
+          <a:stretch>
+            <a:fillRect/>
+          </a:stretch>
+        </p:blipFill>
+        <p:spPr>
+          <a:xfrm>
+            <a:off x="4648200" y="1828800"/>
+            <a:ext cx="3886200" cy="2338665"/>
+          </a:xfrm>
+          <a:prstGeom prst="rect">
+            <a:avLst/>
+          </a:prstGeom>
+        </p:spPr>
+      </p:pic>
+    </p:spTree>
+    <p:extLst>
+      <p:ext uri="{BB962C8B-B14F-4D97-AF65-F5344CB8AC3E}">
+        <p14:creationId xmlns:p14="http://schemas.microsoft.com/office/powerpoint/2010/main" val="1602237527"/>
+      </p:ext>
+    </p:extLst>
+  </p:cSld>
+  <p:clrMapOvr>
+    <a:masterClrMapping/>
+  </p:clrMapOvr>
+  <p:timing>
+    <p:tnLst>
+      <p:par>
+        <p:cTn id="1" dur="indefinite" restart="never" nodeType="tmRoot">
+          <p:childTnLst>
+            <p:seq concurrent="1" nextAc="seek">
+              <p:cTn id="2" dur="indefinite" nodeType="mainSeq">
+                <p:childTnLst>
+                  <p:par>
+                    <p:cTn id="3" fill="hold">
+                      <p:stCondLst>
+                        <p:cond delay="indefinite"/>
+                        <p:cond evt="onBegin" delay="0">
+                          <p:tn val="2"/>
+                        </p:cond>
+                      </p:stCondLst>
+                      <p:childTnLst>
+                        <p:par>
+                          <p:cTn id="4" fill="hold">
+                            <p:stCondLst>
+                              <p:cond delay="0"/>
+                            </p:stCondLst>
+                            <p:childTnLst>
+                              <p:par>
+                                <p:cTn id="5" presetID="1" presetClass="entr" presetSubtype="0" fill="hold" nodeType="withEffect">
+                                  <p:stCondLst>
+                                    <p:cond delay="0"/>
+                                  </p:stCondLst>
+                                  <p:childTnLst>
+                                    <p:set>
+                                      <p:cBhvr>
+                                        <p:cTn id="6" dur="1" fill="hold">
+                                          <p:stCondLst>
+                                            <p:cond delay="0"/>
+                                          </p:stCondLst>
+                                        </p:cTn>
+                                        <p:tgtEl>
+                                          <p:spTgt spid="3">
+                                            <p:txEl>
+                                              <p:pRg st="0" end="0"/>
+                                            </p:txEl>
+                                          </p:spTgt>
+                                        </p:tgtEl>
+                                        <p:attrNameLst>
+                                          <p:attrName>style.visibility</p:attrName>
+                                        </p:attrNameLst>
+                                      </p:cBhvr>
+                                      <p:to>
+                                        <p:strVal val="visible"/>
+                                      </p:to>
+                                    </p:set>
+                                  </p:childTnLst>
+                                </p:cTn>
+                              </p:par>
+                            </p:childTnLst>
+                          </p:cTn>
+                        </p:par>
+                      </p:childTnLst>
+                    </p:cTn>
+                  </p:par>
+                  <p:par>
+                    <p:cTn id="7" fill="hold">
+                      <p:stCondLst>
+                        <p:cond delay="indefinite"/>
+                      </p:stCondLst>
+                      <p:childTnLst>
+                        <p:par>
+                          <p:cTn id="8" fill="hold">
+                            <p:stCondLst>
+                              <p:cond delay="0"/>
+                            </p:stCondLst>
+                            <p:childTnLst>
+                              <p:par>
+                                <p:cTn id="9" presetID="1" presetClass="entr" presetSubtype="0" fill="hold" nodeType="clickEffect">
+                                  <p:stCondLst>
+                                    <p:cond delay="0"/>
+                                  </p:stCondLst>
+                                  <p:childTnLst>
+                                    <p:set>
+                                      <p:cBhvr>
+                                        <p:cTn id="10" dur="1" fill="hold">
+                                          <p:stCondLst>
+                                            <p:cond delay="0"/>
+                                          </p:stCondLst>
+                                        </p:cTn>
+                                        <p:tgtEl>
+                                          <p:spTgt spid="3">
+                                            <p:txEl>
+                                              <p:pRg st="1" end="1"/>
+                                            </p:txEl>
+                                          </p:spTgt>
+                                        </p:tgtEl>
+                                        <p:attrNameLst>
+                                          <p:attrName>style.visibility</p:attrName>
+                                        </p:attrNameLst>
+                                      </p:cBhvr>
+                                      <p:to>
+                                        <p:strVal val="visible"/>
+                                      </p:to>
+                                    </p:set>
+                                  </p:childTnLst>
+                                </p:cTn>
+                              </p:par>
+                            </p:childTnLst>
+                          </p:cTn>
+                        </p:par>
+                      </p:childTnLst>
+                    </p:cTn>
+                  </p:par>
+                  <p:par>
+                    <p:cTn id="11" fill="hold">
+                      <p:stCondLst>
+                        <p:cond delay="indefinite"/>
+                      </p:stCondLst>
+                      <p:childTnLst>
+                        <p:par>
+                          <p:cTn id="12" fill="hold">
+                            <p:stCondLst>
+                              <p:cond delay="0"/>
+                            </p:stCondLst>
+                            <p:childTnLst>
+                              <p:par>
+                                <p:cTn id="13" presetID="1" presetClass="entr" presetSubtype="0" fill="hold" nodeType="clickEffect">
+                                  <p:stCondLst>
+                                    <p:cond delay="0"/>
+                                  </p:stCondLst>
+                                  <p:childTnLst>
+                                    <p:set>
+                                      <p:cBhvr>
+                                        <p:cTn id="14" dur="1" fill="hold">
+                                          <p:stCondLst>
+                                            <p:cond delay="0"/>
+                                          </p:stCondLst>
+                                        </p:cTn>
+                                        <p:tgtEl>
+                                          <p:spTgt spid="3">
+                                            <p:txEl>
+                                              <p:pRg st="2" end="2"/>
+                                            </p:txEl>
+                                          </p:spTgt>
+                                        </p:tgtEl>
+                                        <p:attrNameLst>
+                                          <p:attrName>style.visibility</p:attrName>
+                                        </p:attrNameLst>
+                                      </p:cBhvr>
+                                      <p:to>
+                                        <p:strVal val="visible"/>
+                                      </p:to>
+                                    </p:set>
+                                  </p:childTnLst>
+                                </p:cTn>
+                              </p:par>
+                              <p:par>
+                                <p:cTn id="15" presetID="1" presetClass="entr" presetSubtype="0" fill="hold" nodeType="withEffect">
+                                  <p:stCondLst>
+                                    <p:cond delay="0"/>
+                                  </p:stCondLst>
+                                  <p:childTnLst>
+                                    <p:set>
+                                      <p:cBhvr>
+                                        <p:cTn id="16" dur="1" fill="hold">
+                                          <p:stCondLst>
+                                            <p:cond delay="0"/>
+                                          </p:stCondLst>
+                                        </p:cTn>
+                                        <p:tgtEl>
+                                          <p:spTgt spid="3">
+                                            <p:txEl>
+                                              <p:pRg st="3" end="3"/>
+                                            </p:txEl>
+                                          </p:spTgt>
+                                        </p:tgtEl>
+                                        <p:attrNameLst>
+                                          <p:attrName>style.visibility</p:attrName>
+                                        </p:attrNameLst>
+                                      </p:cBhvr>
+                                      <p:to>
+                                        <p:strVal val="visible"/>
+                                      </p:to>
+                                    </p:set>
+                                  </p:childTnLst>
+                                </p:cTn>
+                              </p:par>
+                              <p:par>
+                                <p:cTn id="17" presetID="1" presetClass="entr" presetSubtype="0" fill="hold" nodeType="withEffect">
+                                  <p:stCondLst>
+                                    <p:cond delay="0"/>
+                                  </p:stCondLst>
+                                  <p:childTnLst>
+                                    <p:set>
+                                      <p:cBhvr>
+                                        <p:cTn id="18" dur="1" fill="hold">
+                                          <p:stCondLst>
+                                            <p:cond delay="0"/>
+                                          </p:stCondLst>
+                                        </p:cTn>
+                                        <p:tgtEl>
+                                          <p:spTgt spid="3">
+                                            <p:txEl>
+                                              <p:pRg st="4" end="4"/>
+                                            </p:txEl>
+                                          </p:spTgt>
+                                        </p:tgtEl>
+                                        <p:attrNameLst>
+                                          <p:attrName>style.visibility</p:attrName>
+                                        </p:attrNameLst>
+                                      </p:cBhvr>
+                                      <p:to>
+                                        <p:strVal val="visible"/>
+                                      </p:to>
+                                    </p:set>
+                                  </p:childTnLst>
+                                </p:cTn>
+                              </p:par>
+                            </p:childTnLst>
+                          </p:cTn>
+                        </p:par>
+                      </p:childTnLst>
+                    </p:cTn>
+                  </p:par>
+                  <p:par>
+                    <p:cTn id="19" fill="hold">
+                      <p:stCondLst>
+                        <p:cond delay="indefinite"/>
+                      </p:stCondLst>
+                      <p:childTnLst>
+                        <p:par>
+                          <p:cTn id="20" fill="hold">
+                            <p:stCondLst>
+                              <p:cond delay="0"/>
+                            </p:stCondLst>
+                            <p:childTnLst>
+                              <p:par>
+                                <p:cTn id="21" presetID="1" presetClass="entr" presetSubtype="0" fill="hold" nodeType="clickEffect">
+                                  <p:stCondLst>
+                                    <p:cond delay="0"/>
+                                  </p:stCondLst>
+                                  <p:childTnLst>
+                                    <p:set>
+                                      <p:cBhvr>
+                                        <p:cTn id="22" dur="1" fill="hold">
+                                          <p:stCondLst>
+                                            <p:cond delay="0"/>
+                                          </p:stCondLst>
+                                        </p:cTn>
+                                        <p:tgtEl>
+                                          <p:spTgt spid="3">
+                                            <p:txEl>
+                                              <p:pRg st="5" end="5"/>
+                                            </p:txEl>
+                                          </p:spTgt>
+                                        </p:tgtEl>
+                                        <p:attrNameLst>
+                                          <p:attrName>style.visibility</p:attrName>
+                                        </p:attrNameLst>
+                                      </p:cBhvr>
+                                      <p:to>
+                                        <p:strVal val="visible"/>
+                                      </p:to>
+                                    </p:set>
+                                  </p:childTnLst>
+                                </p:cTn>
+                              </p:par>
+                              <p:par>
+                                <p:cTn id="23" presetID="1" presetClass="entr" presetSubtype="0" fill="hold" nodeType="withEffect">
+                                  <p:stCondLst>
+                                    <p:cond delay="0"/>
+                                  </p:stCondLst>
+                                  <p:childTnLst>
+                                    <p:set>
+                                      <p:cBhvr>
+                                        <p:cTn id="24" dur="1" fill="hold">
+                                          <p:stCondLst>
+                                            <p:cond delay="0"/>
+                                          </p:stCondLst>
+                                        </p:cTn>
+                                        <p:tgtEl>
+                                          <p:spTgt spid="3">
+                                            <p:txEl>
+                                              <p:pRg st="6" end="6"/>
+                                            </p:txEl>
+                                          </p:spTgt>
+                                        </p:tgtEl>
+                                        <p:attrNameLst>
+                                          <p:attrName>style.visibility</p:attrName>
+                                        </p:attrNameLst>
+                                      </p:cBhvr>
+                                      <p:to>
+                                        <p:strVal val="visible"/>
+                                      </p:to>
+                                    </p:set>
+                                  </p:childTnLst>
+                                </p:cTn>
+                              </p:par>
+                            </p:childTnLst>
+                          </p:cTn>
+                        </p:par>
+                      </p:childTnLst>
+                    </p:cTn>
+                  </p:par>
+                  <p:par>
+                    <p:cTn id="25" fill="hold">
+                      <p:stCondLst>
+                        <p:cond delay="indefinite"/>
+                      </p:stCondLst>
+                      <p:childTnLst>
+                        <p:par>
+                          <p:cTn id="26" fill="hold">
+                            <p:stCondLst>
+                              <p:cond delay="0"/>
+                            </p:stCondLst>
+                            <p:childTnLst>
+                              <p:par>
+                                <p:cTn id="27" presetID="1" presetClass="entr" presetSubtype="0" fill="hold" nodeType="clickEffect">
+                                  <p:stCondLst>
+                                    <p:cond delay="0"/>
+                                  </p:stCondLst>
+                                  <p:childTnLst>
+                                    <p:set>
+                                      <p:cBhvr>
+                                        <p:cTn id="28" dur="1" fill="hold">
+                                          <p:stCondLst>
+                                            <p:cond delay="0"/>
+                                          </p:stCondLst>
+                                        </p:cTn>
+                                        <p:tgtEl>
+                                          <p:spTgt spid="3">
+                                            <p:txEl>
+                                              <p:pRg st="7" end="7"/>
+                                            </p:txEl>
+                                          </p:spTgt>
+                                        </p:tgtEl>
+                                        <p:attrNameLst>
+                                          <p:attrName>style.visibility</p:attrName>
+                                        </p:attrNameLst>
+                                      </p:cBhvr>
+                                      <p:to>
+                                        <p:strVal val="visible"/>
+                                      </p:to>
+                                    </p:set>
+                                  </p:childTnLst>
+                                </p:cTn>
+                              </p:par>
+                            </p:childTnLst>
+                          </p:cTn>
+                        </p:par>
+                      </p:childTnLst>
+                    </p:cTn>
+                  </p:par>
+                  <p:par>
+                    <p:cTn id="29" fill="hold">
+                      <p:stCondLst>
+                        <p:cond delay="indefinite"/>
+                      </p:stCondLst>
+                      <p:childTnLst>
+                        <p:par>
+                          <p:cTn id="30" fill="hold">
+                            <p:stCondLst>
+                              <p:cond delay="0"/>
+                            </p:stCondLst>
+                            <p:childTnLst>
+                              <p:par>
+                                <p:cTn id="31" presetID="1" presetClass="entr" presetSubtype="0" fill="hold" nodeType="clickEffect">
+                                  <p:stCondLst>
+                                    <p:cond delay="0"/>
+                                  </p:stCondLst>
+                                  <p:childTnLst>
+                                    <p:set>
+                                      <p:cBhvr>
+                                        <p:cTn id="32" dur="1" fill="hold">
+                                          <p:stCondLst>
+                                            <p:cond delay="0"/>
+                                          </p:stCondLst>
+                                        </p:cTn>
+                                        <p:tgtEl>
+                                          <p:spTgt spid="3">
+                                            <p:txEl>
+                                              <p:pRg st="8" end="8"/>
+                                            </p:txEl>
+                                          </p:spTgt>
+                                        </p:tgtEl>
+                                        <p:attrNameLst>
+                                          <p:attrName>style.visibility</p:attrName>
+                                        </p:attrNameLst>
+                                      </p:cBhvr>
+                                      <p:to>
+                                        <p:strVal val="visible"/>
+                                      </p:to>
+                                    </p:set>
+                                  </p:childTnLst>
+                                </p:cTn>
+                              </p:par>
+                            </p:childTnLst>
+                          </p:cTn>
+                        </p:par>
+                      </p:childTnLst>
+                    </p:cTn>
+                  </p:par>
+                  <p:par>
+                    <p:cTn id="33" fill="hold">
+                      <p:stCondLst>
+                        <p:cond delay="indefinite"/>
+                      </p:stCondLst>
+                      <p:childTnLst>
+                        <p:par>
+                          <p:cTn id="34" fill="hold">
+                            <p:stCondLst>
+                              <p:cond delay="0"/>
+                            </p:stCondLst>
+                            <p:childTnLst>
+                              <p:par>
+                                <p:cTn id="35" presetID="1" presetClass="entr" presetSubtype="0" fill="hold" nodeType="clickEffect">
+                                  <p:stCondLst>
+                                    <p:cond delay="0"/>
+                                  </p:stCondLst>
+                                  <p:childTnLst>
+                                    <p:set>
+                                      <p:cBhvr>
+                                        <p:cTn id="36" dur="1" fill="hold">
+                                          <p:stCondLst>
+                                            <p:cond delay="0"/>
+                                          </p:stCondLst>
+                                        </p:cTn>
+                                        <p:tgtEl>
+                                          <p:spTgt spid="3">
+                                            <p:txEl>
+                                              <p:pRg st="9" end="9"/>
+                                            </p:txEl>
+                                          </p:spTgt>
+                                        </p:tgtEl>
+                                        <p:attrNameLst>
+                                          <p:attrName>style.visibility</p:attrName>
+                                        </p:attrNameLst>
+                                      </p:cBhvr>
+                                      <p:to>
+                                        <p:strVal val="visible"/>
+                                      </p:to>
+                                    </p:set>
+                                  </p:childTnLst>
+                                </p:cTn>
+                              </p:par>
+                            </p:childTnLst>
+                          </p:cTn>
+                        </p:par>
+                      </p:childTnLst>
+                    </p:cTn>
+                  </p:par>
+                  <p:par>
+                    <p:cTn id="37" fill="hold">
+                      <p:stCondLst>
+                        <p:cond delay="indefinite"/>
+                      </p:stCondLst>
+                      <p:childTnLst>
+                        <p:par>
+                          <p:cTn id="38" fill="hold">
+                            <p:stCondLst>
+                              <p:cond delay="0"/>
+                            </p:stCondLst>
+                            <p:childTnLst>
+                              <p:par>
+                                <p:cTn id="39" presetID="2" presetClass="entr" presetSubtype="2" fill="hold" nodeType="clickEffect">
+                                  <p:stCondLst>
+                                    <p:cond delay="0"/>
+                                  </p:stCondLst>
+                                  <p:childTnLst>
+                                    <p:set>
+                                      <p:cBhvr>
+                                        <p:cTn id="40" dur="1" fill="hold">
+                                          <p:stCondLst>
+                                            <p:cond delay="0"/>
+                                          </p:stCondLst>
+                                        </p:cTn>
+                                        <p:tgtEl>
+                                          <p:spTgt spid="5"/>
+                                        </p:tgtEl>
+                                        <p:attrNameLst>
+                                          <p:attrName>style.visibility</p:attrName>
+                                        </p:attrNameLst>
+                                      </p:cBhvr>
+                                      <p:to>
+                                        <p:strVal val="visible"/>
+                                      </p:to>
+                                    </p:set>
+                                    <p:anim calcmode="lin" valueType="num">
+                                      <p:cBhvr additive="base">
+                                        <p:cTn id="41" dur="500" fill="hold"/>
+                                        <p:tgtEl>
+                                          <p:spTgt spid="5"/>
+                                        </p:tgtEl>
+                                        <p:attrNameLst>
+                                          <p:attrName>ppt_x</p:attrName>
+                                        </p:attrNameLst>
+                                      </p:cBhvr>
+                                      <p:tavLst>
+                                        <p:tav tm="0">
+                                          <p:val>
+                                            <p:strVal val="1+#ppt_w/2"/>
+                                          </p:val>
+                                        </p:tav>
+                                        <p:tav tm="100000">
+                                          <p:val>
+                                            <p:strVal val="#ppt_x"/>
+                                          </p:val>
+                                        </p:tav>
+                                      </p:tavLst>
+                                    </p:anim>
+                                    <p:anim calcmode="lin" valueType="num">
+                                      <p:cBhvr additive="base">
+                                        <p:cTn id="42" dur="500" fill="hold"/>
+                                        <p:tgtEl>
+                                          <p:spTgt spid="5"/>
+                                        </p:tgtEl>
+                                        <p:attrNameLst>
+                                          <p:attrName>ppt_y</p:attrName>
+                                        </p:attrNameLst>
+                                      </p:cBhvr>
+                                      <p:tavLst>
+                                        <p:tav tm="0">
+                                          <p:val>
+                                            <p:strVal val="#ppt_y"/>
+                                          </p:val>
+                                        </p:tav>
+                                        <p:tav tm="100000">
+                                          <p:val>
+                                            <p:strVal val="#ppt_y"/>
+                                          </p:val>
+                                        </p:tav>
+                                      </p:tavLst>
+                                    </p:anim>
+                                  </p:childTnLst>
+                                </p:cTn>
+                              </p:par>
+                            </p:childTnLst>
+                          </p:cTn>
+                        </p:par>
+                      </p:childTnLst>
+                    </p:cTn>
+                  </p:par>
+                  <p:par>
+                    <p:cTn id="43" fill="hold">
+                      <p:stCondLst>
+                        <p:cond delay="indefinite"/>
+                      </p:stCondLst>
+                      <p:childTnLst>
+                        <p:par>
+                          <p:cTn id="44" fill="hold">
+                            <p:stCondLst>
+                              <p:cond delay="0"/>
+                            </p:stCondLst>
+                            <p:childTnLst>
+                              <p:par>
+                                <p:cTn id="45" presetID="1" presetClass="entr" presetSubtype="0" fill="hold" nodeType="clickEffect">
+                                  <p:stCondLst>
+                                    <p:cond delay="0"/>
+                                  </p:stCondLst>
+                                  <p:childTnLst>
+                                    <p:set>
+                                      <p:cBhvr>
+                                        <p:cTn id="46" dur="1" fill="hold">
+                                          <p:stCondLst>
+                                            <p:cond delay="0"/>
+                                          </p:stCondLst>
+                                        </p:cTn>
+                                        <p:tgtEl>
+                                          <p:spTgt spid="3">
+                                            <p:txEl>
+                                              <p:pRg st="10" end="10"/>
+                                            </p:txEl>
+                                          </p:spTgt>
+                                        </p:tgtEl>
+                                        <p:attrNameLst>
+                                          <p:attrName>style.visibility</p:attrName>
+                                        </p:attrNameLst>
+                                      </p:cBhvr>
+                                      <p:to>
+                                        <p:strVal val="visible"/>
+                                      </p:to>
+                                    </p:set>
+                                  </p:childTnLst>
+                                </p:cTn>
+                              </p:par>
+                            </p:childTnLst>
+                          </p:cTn>
+                        </p:par>
+                      </p:childTnLst>
+                    </p:cTn>
+                  </p:par>
+                  <p:par>
+                    <p:cTn id="47" fill="hold">
+                      <p:stCondLst>
+                        <p:cond delay="indefinite"/>
+                      </p:stCondLst>
+                      <p:childTnLst>
+                        <p:par>
+                          <p:cTn id="48" fill="hold">
+                            <p:stCondLst>
+                              <p:cond delay="0"/>
+                            </p:stCondLst>
+                            <p:childTnLst>
+                              <p:par>
+                                <p:cTn id="49" presetID="1" presetClass="entr" presetSubtype="0" fill="hold" nodeType="clickEffect">
+                                  <p:stCondLst>
+                                    <p:cond delay="0"/>
+                                  </p:stCondLst>
+                                  <p:childTnLst>
+                                    <p:set>
+                                      <p:cBhvr>
+                                        <p:cTn id="50" dur="1" fill="hold">
+                                          <p:stCondLst>
+                                            <p:cond delay="0"/>
+                                          </p:stCondLst>
+                                        </p:cTn>
+                                        <p:tgtEl>
+                                          <p:spTgt spid="3">
+                                            <p:txEl>
+                                              <p:pRg st="11" end="11"/>
+                                            </p:txEl>
+                                          </p:spTgt>
+                                        </p:tgtEl>
+                                        <p:attrNameLst>
+                                          <p:attrName>style.visibility</p:attrName>
+                                        </p:attrNameLst>
+                                      </p:cBhvr>
+                                      <p:to>
+                                        <p:strVal val="visible"/>
+                                      </p:to>
+                                    </p:set>
+                                  </p:childTnLst>
+                                </p:cTn>
+                              </p:par>
+                            </p:childTnLst>
+                          </p:cTn>
+                        </p:par>
+                      </p:childTnLst>
+                    </p:cTn>
+                  </p:par>
+                  <p:par>
+                    <p:cTn id="51" fill="hold">
+                      <p:stCondLst>
+                        <p:cond delay="indefinite"/>
+                      </p:stCondLst>
+                      <p:childTnLst>
+                        <p:par>
+                          <p:cTn id="52" fill="hold">
+                            <p:stCondLst>
+                              <p:cond delay="0"/>
+                            </p:stCondLst>
+                            <p:childTnLst>
+                              <p:par>
+                                <p:cTn id="53" presetID="1" presetClass="entr" presetSubtype="0" fill="hold" nodeType="clickEffect">
+                                  <p:stCondLst>
+                                    <p:cond delay="0"/>
+                                  </p:stCondLst>
+                                  <p:childTnLst>
+                                    <p:set>
+                                      <p:cBhvr>
+                                        <p:cTn id="54" dur="1" fill="hold">
+                                          <p:stCondLst>
+                                            <p:cond delay="0"/>
+                                          </p:stCondLst>
+                                        </p:cTn>
+                                        <p:tgtEl>
+                                          <p:spTgt spid="3">
+                                            <p:txEl>
+                                              <p:pRg st="12" end="12"/>
+                                            </p:txEl>
+                                          </p:spTgt>
+                                        </p:tgtEl>
+                                        <p:attrNameLst>
+                                          <p:attrName>style.visibility</p:attrName>
+                                        </p:attrNameLst>
+                                      </p:cBhvr>
+                                      <p:to>
+                                        <p:strVal val="visible"/>
+                                      </p:to>
+                                    </p:set>
+                                  </p:childTnLst>
+                                </p:cTn>
+                              </p:par>
+                            </p:childTnLst>
+                          </p:cTn>
+                        </p:par>
+                      </p:childTnLst>
+                    </p:cTn>
+                  </p:par>
+                </p:childTnLst>
+              </p:cTn>
+              <p:prevCondLst>
+                <p:cond evt="onPrev" delay="0">
+                  <p:tgtEl>
+                    <p:sldTgt/>
+                  </p:tgtEl>
+                </p:cond>
+              </p:prevCondLst>
+              <p:nextCondLst>
+                <p:cond evt="onNext" delay="0">
+                  <p:tgtEl>
+                    <p:sldTgt/>
+                  </p:tgtEl>
+                </p:cond>
+              </p:nextCondLst>
+            </p:seq>
+          </p:childTnLst>
+        </p:cTn>
+      </p:par>
+    </p:tnLst>
+  </p:timing>
+</p:sld>
+</file>
+
+<file path=ppt/slides/slide11.xml><?xml version="1.0" encoding="utf-8"?>
+<p:sld xmlns:a="http://schemas.openxmlformats.org/drawingml/2006/main" xmlns:r="http://schemas.openxmlformats.org/officeDocument/2006/relationships" xmlns:p="http://schemas.openxmlformats.org/presentationml/2006/main">
+  <p:cSld>
+    <p:spTree>
+      <p:nvGrpSpPr>
+        <p:cNvPr id="1" name=""/>
+        <p:cNvGrpSpPr/>
+        <p:nvPr/>
+      </p:nvGrpSpPr>
+      <p:grpSpPr>
+        <a:xfrm>
+          <a:off x="0" y="0"/>
+          <a:ext cx="0" cy="0"/>
+          <a:chOff x="0" y="0"/>
+          <a:chExt cx="0" cy="0"/>
+        </a:xfrm>
+      </p:grpSpPr>
+      <p:sp>
+        <p:nvSpPr>
+          <p:cNvPr id="2" name="Title 1"/>
+          <p:cNvSpPr>
+            <a:spLocks noGrp="1"/>
+          </p:cNvSpPr>
+          <p:nvPr>
+            <p:ph type="title"/>
+          </p:nvPr>
+        </p:nvSpPr>
+        <p:spPr/>
+        <p:txBody>
+          <a:bodyPr/>
+          <a:lstStyle/>
+          <a:p>
+            <a:r>
+              <a:rPr lang="en-US" dirty="0"/>
+              <a:t>Tasks, Challenges &amp; Innovation</a:t>
+            </a:r>
+          </a:p>
+        </p:txBody>
+      </p:sp>
+      <p:sp>
+        <p:nvSpPr>
+          <p:cNvPr id="3" name="Content Placeholder 2"/>
+          <p:cNvSpPr>
+            <a:spLocks noGrp="1"/>
+          </p:cNvSpPr>
+          <p:nvPr>
+            <p:ph idx="1"/>
+          </p:nvPr>
+        </p:nvSpPr>
+        <p:spPr/>
+        <p:txBody>
+          <a:bodyPr/>
+          <a:lstStyle/>
+          <a:p>
+            <a:r>
+              <a:rPr lang="en-US" dirty="0" smtClean="0"/>
               <a:t>Bluetooth Setup</a:t>
             </a:r>
             <a:endParaRPr lang="en-US" dirty="0"/>
@@ -5611,7 +6627,7 @@
 </p:sld>
 </file>
 
-<file path=ppt/slides/slide11.xml><?xml version="1.0" encoding="utf-8"?>
+<file path=ppt/slides/slide12.xml><?xml version="1.0" encoding="utf-8"?>
 <p:sld xmlns:a="http://schemas.openxmlformats.org/drawingml/2006/main" xmlns:r="http://schemas.openxmlformats.org/officeDocument/2006/relationships" xmlns:p="http://schemas.openxmlformats.org/presentationml/2006/main">
   <p:cSld>
     <p:spTree>
@@ -5746,16 +6762,19 @@
             <a:pPr lvl="2"/>
             <a:r>
               <a:rPr lang="en-US" dirty="0" smtClean="0"/>
-              <a:t>Bluetooth and Wi-Fi capability – most smart phones have it</a:t>
-            </a:r>
-          </a:p>
-          <a:p>
-            <a:pPr marL="274320" lvl="1" indent="0">
-              <a:buNone/>
-            </a:pPr>
+              <a:t>Bluetooth and Wi-Fi capability – most smart phones have </a:t>
+            </a:r>
+            <a:r>
+              <a:rPr lang="en-US" dirty="0" smtClean="0"/>
+              <a:t>it</a:t>
+            </a:r>
             <a:endParaRPr lang="en-US" dirty="0" smtClean="0"/>
           </a:p>
           <a:p>
+            <a:r>
+              <a:rPr lang="en-US" dirty="0" smtClean="0"/>
+              <a:t>Basket not implemented</a:t>
+            </a:r>
             <a:endParaRPr lang="en-US" dirty="0"/>
           </a:p>
         </p:txBody>
@@ -5791,7 +6810,7 @@
                             </p:stCondLst>
                             <p:childTnLst>
                               <p:par>
-                                <p:cTn id="5" presetID="1" presetClass="entr" presetSubtype="0" fill="hold" nodeType="clickEffect">
+                                <p:cTn id="5" presetID="1" presetClass="entr" presetSubtype="0" fill="hold" grpId="0" nodeType="clickEffect">
                                   <p:stCondLst>
                                     <p:cond delay="0"/>
                                   </p:stCondLst>
@@ -5840,7 +6859,7 @@
                             </p:stCondLst>
                             <p:childTnLst>
                               <p:par>
-                                <p:cTn id="9" presetID="1" presetClass="entr" presetSubtype="0" fill="hold" nodeType="clickEffect">
+                                <p:cTn id="9" presetID="1" presetClass="entr" presetSubtype="0" fill="hold" grpId="0" nodeType="clickEffect">
                                   <p:stCondLst>
                                     <p:cond delay="0"/>
                                   </p:stCondLst>
@@ -5871,7 +6890,7 @@
                                 </p:cTn>
                               </p:par>
                               <p:par>
-                                <p:cTn id="11" presetID="1" presetClass="entr" presetSubtype="0" fill="hold" nodeType="withEffect">
+                                <p:cTn id="11" presetID="1" presetClass="entr" presetSubtype="0" fill="hold" grpId="0" nodeType="withEffect">
                                   <p:stCondLst>
                                     <p:cond delay="0"/>
                                   </p:stCondLst>
@@ -5920,7 +6939,7 @@
                             </p:stCondLst>
                             <p:childTnLst>
                               <p:par>
-                                <p:cTn id="15" presetID="1" presetClass="entr" presetSubtype="0" fill="hold" nodeType="clickEffect">
+                                <p:cTn id="15" presetID="1" presetClass="entr" presetSubtype="0" fill="hold" grpId="0" nodeType="clickEffect">
                                   <p:stCondLst>
                                     <p:cond delay="0"/>
                                   </p:stCondLst>
@@ -5969,7 +6988,7 @@
                             </p:stCondLst>
                             <p:childTnLst>
                               <p:par>
-                                <p:cTn id="19" presetID="1" presetClass="entr" presetSubtype="0" fill="hold" nodeType="clickEffect">
+                                <p:cTn id="19" presetID="1" presetClass="entr" presetSubtype="0" fill="hold" grpId="0" nodeType="clickEffect">
                                   <p:stCondLst>
                                     <p:cond delay="0"/>
                                   </p:stCondLst>
@@ -6000,7 +7019,7 @@
                                 </p:cTn>
                               </p:par>
                               <p:par>
-                                <p:cTn id="21" presetID="1" presetClass="entr" presetSubtype="0" fill="hold" nodeType="withEffect">
+                                <p:cTn id="21" presetID="1" presetClass="entr" presetSubtype="0" fill="hold" grpId="0" nodeType="withEffect">
                                   <p:stCondLst>
                                     <p:cond delay="0"/>
                                   </p:stCondLst>
@@ -6031,7 +7050,7 @@
                                 </p:cTn>
                               </p:par>
                               <p:par>
-                                <p:cTn id="23" presetID="1" presetClass="entr" presetSubtype="0" fill="hold" nodeType="withEffect">
+                                <p:cTn id="23" presetID="1" presetClass="entr" presetSubtype="0" fill="hold" grpId="0" nodeType="withEffect">
                                   <p:stCondLst>
                                     <p:cond delay="0"/>
                                   </p:stCondLst>
@@ -6062,7 +7081,7 @@
                                 </p:cTn>
                               </p:par>
                               <p:par>
-                                <p:cTn id="25" presetID="1" presetClass="entr" presetSubtype="0" fill="hold" nodeType="withEffect">
+                                <p:cTn id="25" presetID="1" presetClass="entr" presetSubtype="0" fill="hold" grpId="0" nodeType="withEffect">
                                   <p:stCondLst>
                                     <p:cond delay="0"/>
                                   </p:stCondLst>
@@ -6093,7 +7112,7 @@
                                 </p:cTn>
                               </p:par>
                               <p:par>
-                                <p:cTn id="27" presetID="1" presetClass="entr" presetSubtype="0" fill="hold" nodeType="withEffect">
+                                <p:cTn id="27" presetID="1" presetClass="entr" presetSubtype="0" fill="hold" grpId="0" nodeType="withEffect">
                                   <p:stCondLst>
                                     <p:cond delay="0"/>
                                   </p:stCondLst>
@@ -6109,6 +7128,55 @@
                                           <p:spTgt spid="3">
                                             <p:txEl>
                                               <p:pRg st="8" end="8"/>
+                                            </p:txEl>
+                                          </p:spTgt>
+                                        </p:tgtEl>
+                                        <p:attrNameLst>
+                                          <p:attrName>style.visibility</p:attrName>
+                                        </p:attrNameLst>
+                                      </p:cBhvr>
+                                      <p:to>
+                                        <p:strVal val="visible"/>
+                                      </p:to>
+                                    </p:set>
+                                  </p:childTnLst>
+                                </p:cTn>
+                              </p:par>
+                            </p:childTnLst>
+                          </p:cTn>
+                        </p:par>
+                      </p:childTnLst>
+                    </p:cTn>
+                  </p:par>
+                  <p:par>
+                    <p:cTn id="29" fill="hold">
+                      <p:stCondLst>
+                        <p:cond delay="indefinite"/>
+                      </p:stCondLst>
+                      <p:childTnLst>
+                        <p:par>
+                          <p:cTn id="30" fill="hold">
+                            <p:stCondLst>
+                              <p:cond delay="0"/>
+                            </p:stCondLst>
+                            <p:childTnLst>
+                              <p:par>
+                                <p:cTn id="31" presetID="1" presetClass="entr" presetSubtype="0" fill="hold" grpId="0" nodeType="clickEffect">
+                                  <p:stCondLst>
+                                    <p:cond delay="0"/>
+                                  </p:stCondLst>
+                                  <p:childTnLst>
+                                    <p:set>
+                                      <p:cBhvr>
+                                        <p:cTn id="32" dur="1" fill="hold">
+                                          <p:stCondLst>
+                                            <p:cond delay="0"/>
+                                          </p:stCondLst>
+                                        </p:cTn>
+                                        <p:tgtEl>
+                                          <p:spTgt spid="3">
+                                            <p:txEl>
+                                              <p:pRg st="9" end="9"/>
                                             </p:txEl>
                                           </p:spTgt>
                                         </p:tgtEl>
@@ -6150,11 +7218,14 @@
         </p:cTn>
       </p:par>
     </p:tnLst>
+    <p:bldLst>
+      <p:bldP spid="3" grpId="0" build="p"/>
+    </p:bldLst>
   </p:timing>
 </p:sld>
 </file>
 
-<file path=ppt/slides/slide12.xml><?xml version="1.0" encoding="utf-8"?>
+<file path=ppt/slides/slide13.xml><?xml version="1.0" encoding="utf-8"?>
 <p:sld xmlns:a="http://schemas.openxmlformats.org/drawingml/2006/main" xmlns:r="http://schemas.openxmlformats.org/officeDocument/2006/relationships" xmlns:p="http://schemas.openxmlformats.org/presentationml/2006/main">
   <p:cSld>
     <p:spTree>
@@ -6692,7 +7763,7 @@
 </p:sld>
 </file>
 
-<file path=ppt/slides/slide13.xml><?xml version="1.0" encoding="utf-8"?>
+<file path=ppt/slides/slide14.xml><?xml version="1.0" encoding="utf-8"?>
 <p:sld xmlns:a="http://schemas.openxmlformats.org/drawingml/2006/main" xmlns:r="http://schemas.openxmlformats.org/officeDocument/2006/relationships" xmlns:p="http://schemas.openxmlformats.org/presentationml/2006/main">
   <p:cSld>
     <p:spTree>
@@ -7298,7 +8369,7 @@
 </p:sld>
 </file>
 
-<file path=ppt/slides/slide14.xml><?xml version="1.0" encoding="utf-8"?>
+<file path=ppt/slides/slide15.xml><?xml version="1.0" encoding="utf-8"?>
 <p:sld xmlns:a="http://schemas.openxmlformats.org/drawingml/2006/main" xmlns:r="http://schemas.openxmlformats.org/officeDocument/2006/relationships" xmlns:p="http://schemas.openxmlformats.org/presentationml/2006/main">
   <p:cSld>
     <p:spTree>
@@ -14793,6 +15864,185 @@
           </a:p>
         </p:txBody>
       </p:sp>
+      <p:pic>
+        <p:nvPicPr>
+          <p:cNvPr id="4" name="Picture 3"/>
+          <p:cNvPicPr>
+            <a:picLocks noChangeAspect="1"/>
+          </p:cNvPicPr>
+          <p:nvPr/>
+        </p:nvPicPr>
+        <p:blipFill>
+          <a:blip r:embed="rId3">
+            <a:extLst>
+              <a:ext uri="{28A0092B-C50C-407E-A947-70E740481C1C}">
+                <a14:useLocalDpi xmlns:a14="http://schemas.microsoft.com/office/drawing/2010/main" val="0"/>
+              </a:ext>
+            </a:extLst>
+          </a:blip>
+          <a:stretch>
+            <a:fillRect/>
+          </a:stretch>
+        </p:blipFill>
+        <p:spPr>
+          <a:xfrm>
+            <a:off x="1592285" y="1447800"/>
+            <a:ext cx="2522515" cy="4487974"/>
+          </a:xfrm>
+          <a:prstGeom prst="rect">
+            <a:avLst/>
+          </a:prstGeom>
+        </p:spPr>
+      </p:pic>
+      <p:pic>
+        <p:nvPicPr>
+          <p:cNvPr id="5" name="Picture 4"/>
+          <p:cNvPicPr>
+            <a:picLocks noChangeAspect="1"/>
+          </p:cNvPicPr>
+          <p:nvPr/>
+        </p:nvPicPr>
+        <p:blipFill>
+          <a:blip r:embed="rId4">
+            <a:extLst>
+              <a:ext uri="{28A0092B-C50C-407E-A947-70E740481C1C}">
+                <a14:useLocalDpi xmlns:a14="http://schemas.microsoft.com/office/drawing/2010/main" val="0"/>
+              </a:ext>
+            </a:extLst>
+          </a:blip>
+          <a:stretch>
+            <a:fillRect/>
+          </a:stretch>
+        </p:blipFill>
+        <p:spPr>
+          <a:xfrm>
+            <a:off x="5105400" y="1447800"/>
+            <a:ext cx="2522515" cy="4487974"/>
+          </a:xfrm>
+          <a:prstGeom prst="rect">
+            <a:avLst/>
+          </a:prstGeom>
+        </p:spPr>
+      </p:pic>
+      <p:sp>
+        <p:nvSpPr>
+          <p:cNvPr id="6" name="TextBox 5"/>
+          <p:cNvSpPr txBox="1"/>
+          <p:nvPr/>
+        </p:nvSpPr>
+        <p:spPr>
+          <a:xfrm>
+            <a:off x="2062300" y="6224789"/>
+            <a:ext cx="1582484" cy="369332"/>
+          </a:xfrm>
+          <a:prstGeom prst="rect">
+            <a:avLst/>
+          </a:prstGeom>
+          <a:noFill/>
+        </p:spPr>
+        <p:txBody>
+          <a:bodyPr wrap="none" rtlCol="0">
+            <a:spAutoFit/>
+          </a:bodyPr>
+          <a:lstStyle/>
+          <a:p>
+            <a:r>
+              <a:rPr lang="en-US" dirty="0" smtClean="0"/>
+              <a:t>Manual Mode</a:t>
+            </a:r>
+            <a:endParaRPr lang="en-US" dirty="0"/>
+          </a:p>
+        </p:txBody>
+      </p:sp>
+      <p:sp>
+        <p:nvSpPr>
+          <p:cNvPr id="7" name="TextBox 6"/>
+          <p:cNvSpPr txBox="1"/>
+          <p:nvPr/>
+        </p:nvSpPr>
+        <p:spPr>
+          <a:xfrm>
+            <a:off x="5716479" y="6248400"/>
+            <a:ext cx="1300356" cy="369332"/>
+          </a:xfrm>
+          <a:prstGeom prst="rect">
+            <a:avLst/>
+          </a:prstGeom>
+          <a:noFill/>
+        </p:spPr>
+        <p:txBody>
+          <a:bodyPr wrap="none" rtlCol="0">
+            <a:spAutoFit/>
+          </a:bodyPr>
+          <a:lstStyle/>
+          <a:p>
+            <a:r>
+              <a:rPr lang="en-US" dirty="0" smtClean="0"/>
+              <a:t>Auto mode</a:t>
+            </a:r>
+            <a:endParaRPr lang="en-US" dirty="0"/>
+          </a:p>
+        </p:txBody>
+      </p:sp>
+    </p:spTree>
+    <p:extLst>
+      <p:ext uri="{BB962C8B-B14F-4D97-AF65-F5344CB8AC3E}">
+        <p14:creationId xmlns:p14="http://schemas.microsoft.com/office/powerpoint/2010/main" val="1710375954"/>
+      </p:ext>
+    </p:extLst>
+  </p:cSld>
+  <p:clrMapOvr>
+    <a:masterClrMapping/>
+  </p:clrMapOvr>
+  <p:timing>
+    <p:tnLst>
+      <p:par>
+        <p:cTn id="1" dur="indefinite" restart="never" nodeType="tmRoot"/>
+      </p:par>
+    </p:tnLst>
+  </p:timing>
+</p:sld>
+</file>
+
+<file path=ppt/slides/slide9.xml><?xml version="1.0" encoding="utf-8"?>
+<p:sld xmlns:a="http://schemas.openxmlformats.org/drawingml/2006/main" xmlns:r="http://schemas.openxmlformats.org/officeDocument/2006/relationships" xmlns:p="http://schemas.openxmlformats.org/presentationml/2006/main">
+  <p:cSld>
+    <p:spTree>
+      <p:nvGrpSpPr>
+        <p:cNvPr id="1" name=""/>
+        <p:cNvGrpSpPr/>
+        <p:nvPr/>
+      </p:nvGrpSpPr>
+      <p:grpSpPr>
+        <a:xfrm>
+          <a:off x="0" y="0"/>
+          <a:ext cx="0" cy="0"/>
+          <a:chOff x="0" y="0"/>
+          <a:chExt cx="0" cy="0"/>
+        </a:xfrm>
+      </p:grpSpPr>
+      <p:sp>
+        <p:nvSpPr>
+          <p:cNvPr id="2" name="Title 1"/>
+          <p:cNvSpPr>
+            <a:spLocks noGrp="1"/>
+          </p:cNvSpPr>
+          <p:nvPr>
+            <p:ph type="title"/>
+          </p:nvPr>
+        </p:nvSpPr>
+        <p:spPr/>
+        <p:txBody>
+          <a:bodyPr/>
+          <a:lstStyle/>
+          <a:p>
+            <a:r>
+              <a:rPr lang="en-US" dirty="0"/>
+              <a:t>Tasks, Challenges &amp; Innovation</a:t>
+            </a:r>
+          </a:p>
+        </p:txBody>
+      </p:sp>
       <p:sp>
         <p:nvSpPr>
           <p:cNvPr id="3" name="Content Placeholder 2"/>
@@ -15314,937 +16564,6 @@
                                           <p:spTgt spid="3">
                                             <p:txEl>
                                               <p:pRg st="8" end="8"/>
-                                            </p:txEl>
-                                          </p:spTgt>
-                                        </p:tgtEl>
-                                        <p:attrNameLst>
-                                          <p:attrName>style.visibility</p:attrName>
-                                        </p:attrNameLst>
-                                      </p:cBhvr>
-                                      <p:to>
-                                        <p:strVal val="visible"/>
-                                      </p:to>
-                                    </p:set>
-                                  </p:childTnLst>
-                                </p:cTn>
-                              </p:par>
-                            </p:childTnLst>
-                          </p:cTn>
-                        </p:par>
-                      </p:childTnLst>
-                    </p:cTn>
-                  </p:par>
-                </p:childTnLst>
-              </p:cTn>
-              <p:prevCondLst>
-                <p:cond evt="onPrev" delay="0">
-                  <p:tgtEl>
-                    <p:sldTgt/>
-                  </p:tgtEl>
-                </p:cond>
-              </p:prevCondLst>
-              <p:nextCondLst>
-                <p:cond evt="onNext" delay="0">
-                  <p:tgtEl>
-                    <p:sldTgt/>
-                  </p:tgtEl>
-                </p:cond>
-              </p:nextCondLst>
-            </p:seq>
-          </p:childTnLst>
-        </p:cTn>
-      </p:par>
-    </p:tnLst>
-  </p:timing>
-</p:sld>
-</file>
-
-<file path=ppt/slides/slide9.xml><?xml version="1.0" encoding="utf-8"?>
-<p:sld xmlns:a="http://schemas.openxmlformats.org/drawingml/2006/main" xmlns:r="http://schemas.openxmlformats.org/officeDocument/2006/relationships" xmlns:p="http://schemas.openxmlformats.org/presentationml/2006/main">
-  <p:cSld>
-    <p:spTree>
-      <p:nvGrpSpPr>
-        <p:cNvPr id="1" name=""/>
-        <p:cNvGrpSpPr/>
-        <p:nvPr/>
-      </p:nvGrpSpPr>
-      <p:grpSpPr>
-        <a:xfrm>
-          <a:off x="0" y="0"/>
-          <a:ext cx="0" cy="0"/>
-          <a:chOff x="0" y="0"/>
-          <a:chExt cx="0" cy="0"/>
-        </a:xfrm>
-      </p:grpSpPr>
-      <p:sp>
-        <p:nvSpPr>
-          <p:cNvPr id="2" name="Title 1"/>
-          <p:cNvSpPr>
-            <a:spLocks noGrp="1"/>
-          </p:cNvSpPr>
-          <p:nvPr>
-            <p:ph type="title"/>
-          </p:nvPr>
-        </p:nvSpPr>
-        <p:spPr/>
-        <p:txBody>
-          <a:bodyPr/>
-          <a:lstStyle/>
-          <a:p>
-            <a:r>
-              <a:rPr lang="en-US" dirty="0"/>
-              <a:t>Tasks, Challenges &amp; Innovation</a:t>
-            </a:r>
-          </a:p>
-        </p:txBody>
-      </p:sp>
-      <p:sp>
-        <p:nvSpPr>
-          <p:cNvPr id="3" name="Content Placeholder 2"/>
-          <p:cNvSpPr>
-            <a:spLocks noGrp="1"/>
-          </p:cNvSpPr>
-          <p:nvPr>
-            <p:ph idx="1"/>
-          </p:nvPr>
-        </p:nvSpPr>
-        <p:spPr/>
-        <p:txBody>
-          <a:bodyPr/>
-          <a:lstStyle/>
-          <a:p>
-            <a:r>
-              <a:rPr lang="en-US" dirty="0" smtClean="0"/>
-              <a:t>Hardware</a:t>
-            </a:r>
-          </a:p>
-          <a:p>
-            <a:pPr lvl="1"/>
-            <a:r>
-              <a:rPr lang="en-US" dirty="0" smtClean="0"/>
-              <a:t>Camera mounting</a:t>
-            </a:r>
-            <a:endParaRPr lang="en-US" dirty="0"/>
-          </a:p>
-          <a:p>
-            <a:pPr lvl="2"/>
-            <a:r>
-              <a:rPr lang="en-US" dirty="0" smtClean="0"/>
-              <a:t>Front</a:t>
-            </a:r>
-          </a:p>
-          <a:p>
-            <a:pPr lvl="3"/>
-            <a:r>
-              <a:rPr lang="en-US" sz="1800" dirty="0" smtClean="0"/>
-              <a:t>will </a:t>
-            </a:r>
-            <a:r>
-              <a:rPr lang="en-US" sz="1800" dirty="0"/>
-              <a:t>block the sharp </a:t>
-            </a:r>
-            <a:r>
-              <a:rPr lang="en-US" sz="1800" dirty="0" smtClean="0"/>
-              <a:t>sensors</a:t>
-            </a:r>
-          </a:p>
-          <a:p>
-            <a:pPr lvl="3"/>
-            <a:r>
-              <a:rPr lang="en-US" sz="1800" dirty="0"/>
-              <a:t>w</a:t>
-            </a:r>
-            <a:r>
-              <a:rPr lang="en-US" sz="1800" dirty="0" smtClean="0"/>
-              <a:t>ill block grippers movement</a:t>
-            </a:r>
-            <a:endParaRPr lang="en-US" sz="1800" dirty="0"/>
-          </a:p>
-          <a:p>
-            <a:pPr lvl="2"/>
-            <a:r>
-              <a:rPr lang="en-US" dirty="0"/>
-              <a:t>Top </a:t>
-            </a:r>
-          </a:p>
-          <a:p>
-            <a:pPr lvl="3"/>
-            <a:r>
-              <a:rPr lang="en-US" sz="1800" dirty="0" smtClean="0"/>
-              <a:t>Gripper </a:t>
-            </a:r>
-            <a:r>
-              <a:rPr lang="en-US" sz="1800" dirty="0" err="1"/>
-              <a:t>arp</a:t>
-            </a:r>
-            <a:r>
-              <a:rPr lang="en-US" sz="1800" dirty="0"/>
-              <a:t> in its </a:t>
-            </a:r>
-            <a:r>
-              <a:rPr lang="en-US" sz="1800" dirty="0" smtClean="0"/>
-              <a:t>path</a:t>
-            </a:r>
-            <a:endParaRPr lang="en-US" sz="1800" dirty="0"/>
-          </a:p>
-          <a:p>
-            <a:pPr lvl="1"/>
-            <a:r>
-              <a:rPr lang="en-US" dirty="0" smtClean="0"/>
-              <a:t>Sensor</a:t>
-            </a:r>
-            <a:endParaRPr lang="en-US" dirty="0"/>
-          </a:p>
-          <a:p>
-            <a:pPr lvl="2"/>
-            <a:r>
-              <a:rPr lang="en-US" dirty="0"/>
-              <a:t>Single sensor – missed the ball many </a:t>
-            </a:r>
-            <a:r>
-              <a:rPr lang="en-US" dirty="0" smtClean="0"/>
-              <a:t>times</a:t>
-            </a:r>
-          </a:p>
-          <a:p>
-            <a:pPr lvl="1"/>
-            <a:r>
-              <a:rPr lang="en-US" dirty="0" smtClean="0"/>
-              <a:t>Solution</a:t>
-            </a:r>
-          </a:p>
-          <a:p>
-            <a:pPr lvl="2"/>
-            <a:r>
-              <a:rPr lang="en-US" dirty="0" smtClean="0"/>
-              <a:t>Increase the arm’s length</a:t>
-            </a:r>
-          </a:p>
-          <a:p>
-            <a:pPr lvl="2"/>
-            <a:r>
-              <a:rPr lang="en-US" dirty="0" smtClean="0"/>
-              <a:t>Place 2 sensors ON the Camera</a:t>
-            </a:r>
-          </a:p>
-          <a:p>
-            <a:pPr lvl="2"/>
-            <a:r>
-              <a:rPr lang="en-US" dirty="0" smtClean="0"/>
-              <a:t>Fix the Camera in front of bot</a:t>
-            </a:r>
-          </a:p>
-          <a:p>
-            <a:pPr lvl="2"/>
-            <a:endParaRPr lang="en-US" dirty="0"/>
-          </a:p>
-        </p:txBody>
-      </p:sp>
-      <p:pic>
-        <p:nvPicPr>
-          <p:cNvPr id="5" name="Picture 4"/>
-          <p:cNvPicPr>
-            <a:picLocks noChangeAspect="1"/>
-          </p:cNvPicPr>
-          <p:nvPr/>
-        </p:nvPicPr>
-        <p:blipFill>
-          <a:blip r:embed="rId3" cstate="print">
-            <a:extLst>
-              <a:ext uri="{28A0092B-C50C-407E-A947-70E740481C1C}">
-                <a14:useLocalDpi xmlns:a14="http://schemas.microsoft.com/office/drawing/2010/main" val="0"/>
-              </a:ext>
-            </a:extLst>
-          </a:blip>
-          <a:stretch>
-            <a:fillRect/>
-          </a:stretch>
-        </p:blipFill>
-        <p:spPr>
-          <a:xfrm>
-            <a:off x="4648200" y="1828800"/>
-            <a:ext cx="3886200" cy="2338665"/>
-          </a:xfrm>
-          <a:prstGeom prst="rect">
-            <a:avLst/>
-          </a:prstGeom>
-        </p:spPr>
-      </p:pic>
-    </p:spTree>
-    <p:extLst>
-      <p:ext uri="{BB962C8B-B14F-4D97-AF65-F5344CB8AC3E}">
-        <p14:creationId xmlns:p14="http://schemas.microsoft.com/office/powerpoint/2010/main" val="1602237527"/>
-      </p:ext>
-    </p:extLst>
-  </p:cSld>
-  <p:clrMapOvr>
-    <a:masterClrMapping/>
-  </p:clrMapOvr>
-  <p:timing>
-    <p:tnLst>
-      <p:par>
-        <p:cTn id="1" dur="indefinite" restart="never" nodeType="tmRoot">
-          <p:childTnLst>
-            <p:seq concurrent="1" nextAc="seek">
-              <p:cTn id="2" dur="indefinite" nodeType="mainSeq">
-                <p:childTnLst>
-                  <p:par>
-                    <p:cTn id="3" fill="hold">
-                      <p:stCondLst>
-                        <p:cond delay="indefinite"/>
-                        <p:cond evt="onBegin" delay="0">
-                          <p:tn val="2"/>
-                        </p:cond>
-                      </p:stCondLst>
-                      <p:childTnLst>
-                        <p:par>
-                          <p:cTn id="4" fill="hold">
-                            <p:stCondLst>
-                              <p:cond delay="0"/>
-                            </p:stCondLst>
-                            <p:childTnLst>
-                              <p:par>
-                                <p:cTn id="5" presetID="1" presetClass="entr" presetSubtype="0" fill="hold" nodeType="withEffect">
-                                  <p:stCondLst>
-                                    <p:cond delay="0"/>
-                                  </p:stCondLst>
-                                  <p:childTnLst>
-                                    <p:set>
-                                      <p:cBhvr>
-                                        <p:cTn id="6" dur="1" fill="hold">
-                                          <p:stCondLst>
-                                            <p:cond delay="0"/>
-                                          </p:stCondLst>
-                                        </p:cTn>
-                                        <p:tgtEl>
-                                          <p:spTgt spid="3">
-                                            <p:txEl>
-                                              <p:pRg st="0" end="0"/>
-                                            </p:txEl>
-                                          </p:spTgt>
-                                        </p:tgtEl>
-                                        <p:attrNameLst>
-                                          <p:attrName>style.visibility</p:attrName>
-                                        </p:attrNameLst>
-                                      </p:cBhvr>
-                                      <p:to>
-                                        <p:strVal val="visible"/>
-                                      </p:to>
-                                    </p:set>
-                                  </p:childTnLst>
-                                </p:cTn>
-                              </p:par>
-                            </p:childTnLst>
-                          </p:cTn>
-                        </p:par>
-                      </p:childTnLst>
-                    </p:cTn>
-                  </p:par>
-                  <p:par>
-                    <p:cTn id="7" fill="hold">
-                      <p:stCondLst>
-                        <p:cond delay="indefinite"/>
-                      </p:stCondLst>
-                      <p:childTnLst>
-                        <p:par>
-                          <p:cTn id="8" fill="hold">
-                            <p:stCondLst>
-                              <p:cond delay="0"/>
-                            </p:stCondLst>
-                            <p:childTnLst>
-                              <p:par>
-                                <p:cTn id="9" presetID="1" presetClass="entr" presetSubtype="0" fill="hold" nodeType="clickEffect">
-                                  <p:stCondLst>
-                                    <p:cond delay="0"/>
-                                  </p:stCondLst>
-                                  <p:childTnLst>
-                                    <p:set>
-                                      <p:cBhvr>
-                                        <p:cTn id="10" dur="1" fill="hold">
-                                          <p:stCondLst>
-                                            <p:cond delay="0"/>
-                                          </p:stCondLst>
-                                        </p:cTn>
-                                        <p:tgtEl>
-                                          <p:spTgt spid="3">
-                                            <p:txEl>
-                                              <p:pRg st="1" end="1"/>
-                                            </p:txEl>
-                                          </p:spTgt>
-                                        </p:tgtEl>
-                                        <p:attrNameLst>
-                                          <p:attrName>style.visibility</p:attrName>
-                                        </p:attrNameLst>
-                                      </p:cBhvr>
-                                      <p:to>
-                                        <p:strVal val="visible"/>
-                                      </p:to>
-                                    </p:set>
-                                  </p:childTnLst>
-                                </p:cTn>
-                              </p:par>
-                            </p:childTnLst>
-                          </p:cTn>
-                        </p:par>
-                      </p:childTnLst>
-                    </p:cTn>
-                  </p:par>
-                  <p:par>
-                    <p:cTn id="11" fill="hold">
-                      <p:stCondLst>
-                        <p:cond delay="indefinite"/>
-                      </p:stCondLst>
-                      <p:childTnLst>
-                        <p:par>
-                          <p:cTn id="12" fill="hold">
-                            <p:stCondLst>
-                              <p:cond delay="0"/>
-                            </p:stCondLst>
-                            <p:childTnLst>
-                              <p:par>
-                                <p:cTn id="13" presetID="1" presetClass="entr" presetSubtype="0" fill="hold" nodeType="clickEffect">
-                                  <p:stCondLst>
-                                    <p:cond delay="0"/>
-                                  </p:stCondLst>
-                                  <p:childTnLst>
-                                    <p:set>
-                                      <p:cBhvr>
-                                        <p:cTn id="14" dur="1" fill="hold">
-                                          <p:stCondLst>
-                                            <p:cond delay="0"/>
-                                          </p:stCondLst>
-                                        </p:cTn>
-                                        <p:tgtEl>
-                                          <p:spTgt spid="3">
-                                            <p:txEl>
-                                              <p:pRg st="2" end="2"/>
-                                            </p:txEl>
-                                          </p:spTgt>
-                                        </p:tgtEl>
-                                        <p:attrNameLst>
-                                          <p:attrName>style.visibility</p:attrName>
-                                        </p:attrNameLst>
-                                      </p:cBhvr>
-                                      <p:to>
-                                        <p:strVal val="visible"/>
-                                      </p:to>
-                                    </p:set>
-                                  </p:childTnLst>
-                                </p:cTn>
-                              </p:par>
-                              <p:par>
-                                <p:cTn id="15" presetID="1" presetClass="entr" presetSubtype="0" fill="hold" nodeType="withEffect">
-                                  <p:stCondLst>
-                                    <p:cond delay="0"/>
-                                  </p:stCondLst>
-                                  <p:childTnLst>
-                                    <p:set>
-                                      <p:cBhvr>
-                                        <p:cTn id="16" dur="1" fill="hold">
-                                          <p:stCondLst>
-                                            <p:cond delay="0"/>
-                                          </p:stCondLst>
-                                        </p:cTn>
-                                        <p:tgtEl>
-                                          <p:spTgt spid="3">
-                                            <p:txEl>
-                                              <p:pRg st="3" end="3"/>
-                                            </p:txEl>
-                                          </p:spTgt>
-                                        </p:tgtEl>
-                                        <p:attrNameLst>
-                                          <p:attrName>style.visibility</p:attrName>
-                                        </p:attrNameLst>
-                                      </p:cBhvr>
-                                      <p:to>
-                                        <p:strVal val="visible"/>
-                                      </p:to>
-                                    </p:set>
-                                  </p:childTnLst>
-                                </p:cTn>
-                              </p:par>
-                              <p:par>
-                                <p:cTn id="17" presetID="1" presetClass="entr" presetSubtype="0" fill="hold" nodeType="withEffect">
-                                  <p:stCondLst>
-                                    <p:cond delay="0"/>
-                                  </p:stCondLst>
-                                  <p:childTnLst>
-                                    <p:set>
-                                      <p:cBhvr>
-                                        <p:cTn id="18" dur="1" fill="hold">
-                                          <p:stCondLst>
-                                            <p:cond delay="0"/>
-                                          </p:stCondLst>
-                                        </p:cTn>
-                                        <p:tgtEl>
-                                          <p:spTgt spid="3">
-                                            <p:txEl>
-                                              <p:pRg st="4" end="4"/>
-                                            </p:txEl>
-                                          </p:spTgt>
-                                        </p:tgtEl>
-                                        <p:attrNameLst>
-                                          <p:attrName>style.visibility</p:attrName>
-                                        </p:attrNameLst>
-                                      </p:cBhvr>
-                                      <p:to>
-                                        <p:strVal val="visible"/>
-                                      </p:to>
-                                    </p:set>
-                                  </p:childTnLst>
-                                </p:cTn>
-                              </p:par>
-                            </p:childTnLst>
-                          </p:cTn>
-                        </p:par>
-                      </p:childTnLst>
-                    </p:cTn>
-                  </p:par>
-                  <p:par>
-                    <p:cTn id="19" fill="hold">
-                      <p:stCondLst>
-                        <p:cond delay="indefinite"/>
-                      </p:stCondLst>
-                      <p:childTnLst>
-                        <p:par>
-                          <p:cTn id="20" fill="hold">
-                            <p:stCondLst>
-                              <p:cond delay="0"/>
-                            </p:stCondLst>
-                            <p:childTnLst>
-                              <p:par>
-                                <p:cTn id="21" presetID="1" presetClass="entr" presetSubtype="0" fill="hold" nodeType="clickEffect">
-                                  <p:stCondLst>
-                                    <p:cond delay="0"/>
-                                  </p:stCondLst>
-                                  <p:childTnLst>
-                                    <p:set>
-                                      <p:cBhvr>
-                                        <p:cTn id="22" dur="1" fill="hold">
-                                          <p:stCondLst>
-                                            <p:cond delay="0"/>
-                                          </p:stCondLst>
-                                        </p:cTn>
-                                        <p:tgtEl>
-                                          <p:spTgt spid="3">
-                                            <p:txEl>
-                                              <p:pRg st="5" end="5"/>
-                                            </p:txEl>
-                                          </p:spTgt>
-                                        </p:tgtEl>
-                                        <p:attrNameLst>
-                                          <p:attrName>style.visibility</p:attrName>
-                                        </p:attrNameLst>
-                                      </p:cBhvr>
-                                      <p:to>
-                                        <p:strVal val="visible"/>
-                                      </p:to>
-                                    </p:set>
-                                  </p:childTnLst>
-                                </p:cTn>
-                              </p:par>
-                              <p:par>
-                                <p:cTn id="23" presetID="1" presetClass="entr" presetSubtype="0" fill="hold" nodeType="withEffect">
-                                  <p:stCondLst>
-                                    <p:cond delay="0"/>
-                                  </p:stCondLst>
-                                  <p:childTnLst>
-                                    <p:set>
-                                      <p:cBhvr>
-                                        <p:cTn id="24" dur="1" fill="hold">
-                                          <p:stCondLst>
-                                            <p:cond delay="0"/>
-                                          </p:stCondLst>
-                                        </p:cTn>
-                                        <p:tgtEl>
-                                          <p:spTgt spid="3">
-                                            <p:txEl>
-                                              <p:pRg st="6" end="6"/>
-                                            </p:txEl>
-                                          </p:spTgt>
-                                        </p:tgtEl>
-                                        <p:attrNameLst>
-                                          <p:attrName>style.visibility</p:attrName>
-                                        </p:attrNameLst>
-                                      </p:cBhvr>
-                                      <p:to>
-                                        <p:strVal val="visible"/>
-                                      </p:to>
-                                    </p:set>
-                                  </p:childTnLst>
-                                </p:cTn>
-                              </p:par>
-                            </p:childTnLst>
-                          </p:cTn>
-                        </p:par>
-                      </p:childTnLst>
-                    </p:cTn>
-                  </p:par>
-                  <p:par>
-                    <p:cTn id="25" fill="hold">
-                      <p:stCondLst>
-                        <p:cond delay="indefinite"/>
-                      </p:stCondLst>
-                      <p:childTnLst>
-                        <p:par>
-                          <p:cTn id="26" fill="hold">
-                            <p:stCondLst>
-                              <p:cond delay="0"/>
-                            </p:stCondLst>
-                            <p:childTnLst>
-                              <p:par>
-                                <p:cTn id="27" presetID="1" presetClass="entr" presetSubtype="0" fill="hold" nodeType="clickEffect">
-                                  <p:stCondLst>
-                                    <p:cond delay="0"/>
-                                  </p:stCondLst>
-                                  <p:childTnLst>
-                                    <p:set>
-                                      <p:cBhvr>
-                                        <p:cTn id="28" dur="1" fill="hold">
-                                          <p:stCondLst>
-                                            <p:cond delay="0"/>
-                                          </p:stCondLst>
-                                        </p:cTn>
-                                        <p:tgtEl>
-                                          <p:spTgt spid="3">
-                                            <p:txEl>
-                                              <p:pRg st="7" end="7"/>
-                                            </p:txEl>
-                                          </p:spTgt>
-                                        </p:tgtEl>
-                                        <p:attrNameLst>
-                                          <p:attrName>style.visibility</p:attrName>
-                                        </p:attrNameLst>
-                                      </p:cBhvr>
-                                      <p:to>
-                                        <p:strVal val="visible"/>
-                                      </p:to>
-                                    </p:set>
-                                  </p:childTnLst>
-                                </p:cTn>
-                              </p:par>
-                            </p:childTnLst>
-                          </p:cTn>
-                        </p:par>
-                      </p:childTnLst>
-                    </p:cTn>
-                  </p:par>
-                  <p:par>
-                    <p:cTn id="29" fill="hold">
-                      <p:stCondLst>
-                        <p:cond delay="indefinite"/>
-                      </p:stCondLst>
-                      <p:childTnLst>
-                        <p:par>
-                          <p:cTn id="30" fill="hold">
-                            <p:stCondLst>
-                              <p:cond delay="0"/>
-                            </p:stCondLst>
-                            <p:childTnLst>
-                              <p:par>
-                                <p:cTn id="31" presetID="1" presetClass="entr" presetSubtype="0" fill="hold" nodeType="clickEffect">
-                                  <p:stCondLst>
-                                    <p:cond delay="0"/>
-                                  </p:stCondLst>
-                                  <p:childTnLst>
-                                    <p:set>
-                                      <p:cBhvr>
-                                        <p:cTn id="32" dur="1" fill="hold">
-                                          <p:stCondLst>
-                                            <p:cond delay="0"/>
-                                          </p:stCondLst>
-                                        </p:cTn>
-                                        <p:tgtEl>
-                                          <p:spTgt spid="3">
-                                            <p:txEl>
-                                              <p:pRg st="8" end="8"/>
-                                            </p:txEl>
-                                          </p:spTgt>
-                                        </p:tgtEl>
-                                        <p:attrNameLst>
-                                          <p:attrName>style.visibility</p:attrName>
-                                        </p:attrNameLst>
-                                      </p:cBhvr>
-                                      <p:to>
-                                        <p:strVal val="visible"/>
-                                      </p:to>
-                                    </p:set>
-                                  </p:childTnLst>
-                                </p:cTn>
-                              </p:par>
-                            </p:childTnLst>
-                          </p:cTn>
-                        </p:par>
-                      </p:childTnLst>
-                    </p:cTn>
-                  </p:par>
-                  <p:par>
-                    <p:cTn id="33" fill="hold">
-                      <p:stCondLst>
-                        <p:cond delay="indefinite"/>
-                      </p:stCondLst>
-                      <p:childTnLst>
-                        <p:par>
-                          <p:cTn id="34" fill="hold">
-                            <p:stCondLst>
-                              <p:cond delay="0"/>
-                            </p:stCondLst>
-                            <p:childTnLst>
-                              <p:par>
-                                <p:cTn id="35" presetID="1" presetClass="entr" presetSubtype="0" fill="hold" nodeType="clickEffect">
-                                  <p:stCondLst>
-                                    <p:cond delay="0"/>
-                                  </p:stCondLst>
-                                  <p:childTnLst>
-                                    <p:set>
-                                      <p:cBhvr>
-                                        <p:cTn id="36" dur="1" fill="hold">
-                                          <p:stCondLst>
-                                            <p:cond delay="0"/>
-                                          </p:stCondLst>
-                                        </p:cTn>
-                                        <p:tgtEl>
-                                          <p:spTgt spid="3">
-                                            <p:txEl>
-                                              <p:pRg st="9" end="9"/>
-                                            </p:txEl>
-                                          </p:spTgt>
-                                        </p:tgtEl>
-                                        <p:attrNameLst>
-                                          <p:attrName>style.visibility</p:attrName>
-                                        </p:attrNameLst>
-                                      </p:cBhvr>
-                                      <p:to>
-                                        <p:strVal val="visible"/>
-                                      </p:to>
-                                    </p:set>
-                                  </p:childTnLst>
-                                </p:cTn>
-                              </p:par>
-                            </p:childTnLst>
-                          </p:cTn>
-                        </p:par>
-                      </p:childTnLst>
-                    </p:cTn>
-                  </p:par>
-                  <p:par>
-                    <p:cTn id="37" fill="hold">
-                      <p:stCondLst>
-                        <p:cond delay="indefinite"/>
-                      </p:stCondLst>
-                      <p:childTnLst>
-                        <p:par>
-                          <p:cTn id="38" fill="hold">
-                            <p:stCondLst>
-                              <p:cond delay="0"/>
-                            </p:stCondLst>
-                            <p:childTnLst>
-                              <p:par>
-                                <p:cTn id="39" presetID="2" presetClass="entr" presetSubtype="2" fill="hold" nodeType="clickEffect">
-                                  <p:stCondLst>
-                                    <p:cond delay="0"/>
-                                  </p:stCondLst>
-                                  <p:childTnLst>
-                                    <p:set>
-                                      <p:cBhvr>
-                                        <p:cTn id="40" dur="1" fill="hold">
-                                          <p:stCondLst>
-                                            <p:cond delay="0"/>
-                                          </p:stCondLst>
-                                        </p:cTn>
-                                        <p:tgtEl>
-                                          <p:spTgt spid="5"/>
-                                        </p:tgtEl>
-                                        <p:attrNameLst>
-                                          <p:attrName>style.visibility</p:attrName>
-                                        </p:attrNameLst>
-                                      </p:cBhvr>
-                                      <p:to>
-                                        <p:strVal val="visible"/>
-                                      </p:to>
-                                    </p:set>
-                                    <p:anim calcmode="lin" valueType="num">
-                                      <p:cBhvr additive="base">
-                                        <p:cTn id="41" dur="500" fill="hold"/>
-                                        <p:tgtEl>
-                                          <p:spTgt spid="5"/>
-                                        </p:tgtEl>
-                                        <p:attrNameLst>
-                                          <p:attrName>ppt_x</p:attrName>
-                                        </p:attrNameLst>
-                                      </p:cBhvr>
-                                      <p:tavLst>
-                                        <p:tav tm="0">
-                                          <p:val>
-                                            <p:strVal val="1+#ppt_w/2"/>
-                                          </p:val>
-                                        </p:tav>
-                                        <p:tav tm="100000">
-                                          <p:val>
-                                            <p:strVal val="#ppt_x"/>
-                                          </p:val>
-                                        </p:tav>
-                                      </p:tavLst>
-                                    </p:anim>
-                                    <p:anim calcmode="lin" valueType="num">
-                                      <p:cBhvr additive="base">
-                                        <p:cTn id="42" dur="500" fill="hold"/>
-                                        <p:tgtEl>
-                                          <p:spTgt spid="5"/>
-                                        </p:tgtEl>
-                                        <p:attrNameLst>
-                                          <p:attrName>ppt_y</p:attrName>
-                                        </p:attrNameLst>
-                                      </p:cBhvr>
-                                      <p:tavLst>
-                                        <p:tav tm="0">
-                                          <p:val>
-                                            <p:strVal val="#ppt_y"/>
-                                          </p:val>
-                                        </p:tav>
-                                        <p:tav tm="100000">
-                                          <p:val>
-                                            <p:strVal val="#ppt_y"/>
-                                          </p:val>
-                                        </p:tav>
-                                      </p:tavLst>
-                                    </p:anim>
-                                  </p:childTnLst>
-                                </p:cTn>
-                              </p:par>
-                            </p:childTnLst>
-                          </p:cTn>
-                        </p:par>
-                      </p:childTnLst>
-                    </p:cTn>
-                  </p:par>
-                  <p:par>
-                    <p:cTn id="43" fill="hold">
-                      <p:stCondLst>
-                        <p:cond delay="indefinite"/>
-                      </p:stCondLst>
-                      <p:childTnLst>
-                        <p:par>
-                          <p:cTn id="44" fill="hold">
-                            <p:stCondLst>
-                              <p:cond delay="0"/>
-                            </p:stCondLst>
-                            <p:childTnLst>
-                              <p:par>
-                                <p:cTn id="45" presetID="1" presetClass="entr" presetSubtype="0" fill="hold" nodeType="clickEffect">
-                                  <p:stCondLst>
-                                    <p:cond delay="0"/>
-                                  </p:stCondLst>
-                                  <p:childTnLst>
-                                    <p:set>
-                                      <p:cBhvr>
-                                        <p:cTn id="46" dur="1" fill="hold">
-                                          <p:stCondLst>
-                                            <p:cond delay="0"/>
-                                          </p:stCondLst>
-                                        </p:cTn>
-                                        <p:tgtEl>
-                                          <p:spTgt spid="3">
-                                            <p:txEl>
-                                              <p:pRg st="10" end="10"/>
-                                            </p:txEl>
-                                          </p:spTgt>
-                                        </p:tgtEl>
-                                        <p:attrNameLst>
-                                          <p:attrName>style.visibility</p:attrName>
-                                        </p:attrNameLst>
-                                      </p:cBhvr>
-                                      <p:to>
-                                        <p:strVal val="visible"/>
-                                      </p:to>
-                                    </p:set>
-                                  </p:childTnLst>
-                                </p:cTn>
-                              </p:par>
-                            </p:childTnLst>
-                          </p:cTn>
-                        </p:par>
-                      </p:childTnLst>
-                    </p:cTn>
-                  </p:par>
-                  <p:par>
-                    <p:cTn id="47" fill="hold">
-                      <p:stCondLst>
-                        <p:cond delay="indefinite"/>
-                      </p:stCondLst>
-                      <p:childTnLst>
-                        <p:par>
-                          <p:cTn id="48" fill="hold">
-                            <p:stCondLst>
-                              <p:cond delay="0"/>
-                            </p:stCondLst>
-                            <p:childTnLst>
-                              <p:par>
-                                <p:cTn id="49" presetID="1" presetClass="entr" presetSubtype="0" fill="hold" nodeType="clickEffect">
-                                  <p:stCondLst>
-                                    <p:cond delay="0"/>
-                                  </p:stCondLst>
-                                  <p:childTnLst>
-                                    <p:set>
-                                      <p:cBhvr>
-                                        <p:cTn id="50" dur="1" fill="hold">
-                                          <p:stCondLst>
-                                            <p:cond delay="0"/>
-                                          </p:stCondLst>
-                                        </p:cTn>
-                                        <p:tgtEl>
-                                          <p:spTgt spid="3">
-                                            <p:txEl>
-                                              <p:pRg st="11" end="11"/>
-                                            </p:txEl>
-                                          </p:spTgt>
-                                        </p:tgtEl>
-                                        <p:attrNameLst>
-                                          <p:attrName>style.visibility</p:attrName>
-                                        </p:attrNameLst>
-                                      </p:cBhvr>
-                                      <p:to>
-                                        <p:strVal val="visible"/>
-                                      </p:to>
-                                    </p:set>
-                                  </p:childTnLst>
-                                </p:cTn>
-                              </p:par>
-                            </p:childTnLst>
-                          </p:cTn>
-                        </p:par>
-                      </p:childTnLst>
-                    </p:cTn>
-                  </p:par>
-                  <p:par>
-                    <p:cTn id="51" fill="hold">
-                      <p:stCondLst>
-                        <p:cond delay="indefinite"/>
-                      </p:stCondLst>
-                      <p:childTnLst>
-                        <p:par>
-                          <p:cTn id="52" fill="hold">
-                            <p:stCondLst>
-                              <p:cond delay="0"/>
-                            </p:stCondLst>
-                            <p:childTnLst>
-                              <p:par>
-                                <p:cTn id="53" presetID="1" presetClass="entr" presetSubtype="0" fill="hold" nodeType="clickEffect">
-                                  <p:stCondLst>
-                                    <p:cond delay="0"/>
-                                  </p:stCondLst>
-                                  <p:childTnLst>
-                                    <p:set>
-                                      <p:cBhvr>
-                                        <p:cTn id="54" dur="1" fill="hold">
-                                          <p:stCondLst>
-                                            <p:cond delay="0"/>
-                                          </p:stCondLst>
-                                        </p:cTn>
-                                        <p:tgtEl>
-                                          <p:spTgt spid="3">
-                                            <p:txEl>
-                                              <p:pRg st="12" end="12"/>
                                             </p:txEl>
                                           </p:spTgt>
                                         </p:tgtEl>

</xml_diff>